<commit_message>
I have added slides 17&18 on 'Pull' command: we had forgotten to add them, all notes on slides have been removed because they were for SourceTree, and I have also removed from the apendix references of SourceTree and added the link which Steve shared with us in his most recent email.
I have also removed fullstops from every statement on the power point because I thought they are unnecesary in a powerpoint presentations.
</commit_message>
<xml_diff>
--- a/Appendix for Git-v1.1.pptx
+++ b/Appendix for Git-v1.1.pptx
@@ -1,6 +1,6 @@
 
 <file path=ppt/presentation.xml><?xml version="1.0" encoding="utf-8"?>
-<p:presentation xmlns:a="http://schemas.openxmlformats.org/drawingml/2006/main" xmlns:r="http://schemas.openxmlformats.org/officeDocument/2006/relationships" xmlns:mc="http://schemas.openxmlformats.org/markup-compatibility/2006" xmlns:mv="urn:schemas-microsoft-com:mac:vml" xmlns:p="http://schemas.openxmlformats.org/presentationml/2006/main" mc:Ignorable="mv" mc:PreserveAttributes="mv:*" saveSubsetFonts="1">
+<p:presentation xmlns:a="http://schemas.openxmlformats.org/drawingml/2006/main" xmlns:r="http://schemas.openxmlformats.org/officeDocument/2006/relationships" xmlns:p="http://schemas.openxmlformats.org/presentationml/2006/main" saveSubsetFonts="1">
   <p:sldMasterIdLst>
     <p:sldMasterId id="2147483707" r:id="rId1"/>
   </p:sldMasterIdLst>
@@ -115,7 +115,7 @@
   </p:defaultTextStyle>
   <p:extLst>
     <p:ext uri="{EFAFB233-063F-42B5-8137-9DF3F51BA10A}">
-      <p15:sldGuideLst xmlns="" xmlns:a="http://schemas.openxmlformats.org/drawingml/2006/main" xmlns:r="http://schemas.openxmlformats.org/officeDocument/2006/relationships" xmlns:p="http://schemas.openxmlformats.org/presentationml/2006/main" xmlns:p15="http://schemas.microsoft.com/office/powerpoint/2012/main" xmlns:mv="urn:schemas-microsoft-com:mac:vml" xmlns:mc="http://schemas.openxmlformats.org/markup-compatibility/2006">
+      <p15:sldGuideLst xmlns:p15="http://schemas.microsoft.com/office/powerpoint/2012/main">
         <p15:guide id="1" orient="horz" pos="2160">
           <p15:clr>
             <a:srgbClr val="A4A3A4"/>
@@ -133,18 +133,18 @@
 </file>
 
 <file path=ppt/commentAuthors.xml><?xml version="1.0" encoding="utf-8"?>
-<p:cmAuthorLst xmlns:a="http://schemas.openxmlformats.org/drawingml/2006/main" xmlns:r="http://schemas.openxmlformats.org/officeDocument/2006/relationships" xmlns:mc="http://schemas.openxmlformats.org/markup-compatibility/2006" xmlns:mv="urn:schemas-microsoft-com:mac:vml" xmlns:p="http://schemas.openxmlformats.org/presentationml/2006/main" mc:Ignorable="mv" mc:PreserveAttributes="mv:*">
+<p:cmAuthorLst xmlns:a="http://schemas.openxmlformats.org/drawingml/2006/main" xmlns:r="http://schemas.openxmlformats.org/officeDocument/2006/relationships" xmlns:p="http://schemas.openxmlformats.org/presentationml/2006/main">
   <p:cmAuthor id="1" name="Joseph Sempa" initials="JS" lastIdx="7" clrIdx="0">
     <p:extLst>
       <p:ext uri="{19B8F6BF-5375-455C-9EA6-DF929625EA0E}">
-        <p15:presenceInfo xmlns="" xmlns:a="http://schemas.openxmlformats.org/drawingml/2006/main" xmlns:r="http://schemas.openxmlformats.org/officeDocument/2006/relationships" xmlns:p="http://schemas.openxmlformats.org/presentationml/2006/main" xmlns:p15="http://schemas.microsoft.com/office/powerpoint/2012/main" xmlns:mv="urn:schemas-microsoft-com:mac:vml" xmlns:mc="http://schemas.openxmlformats.org/markup-compatibility/2006" userId="6a318720dea0050f" providerId="Windows Live"/>
+        <p15:presenceInfo xmlns:p15="http://schemas.microsoft.com/office/powerpoint/2012/main" userId="6a318720dea0050f" providerId="Windows Live"/>
       </p:ext>
     </p:extLst>
   </p:cmAuthor>
   <p:cmAuthor id="2" name="Eva" initials="E" lastIdx="5" clrIdx="1">
     <p:extLst>
       <p:ext uri="{19B8F6BF-5375-455C-9EA6-DF929625EA0E}">
-        <p15:presenceInfo xmlns="" xmlns:a="http://schemas.openxmlformats.org/drawingml/2006/main" xmlns:r="http://schemas.openxmlformats.org/officeDocument/2006/relationships" xmlns:p="http://schemas.openxmlformats.org/presentationml/2006/main" xmlns:p15="http://schemas.microsoft.com/office/powerpoint/2012/main" xmlns:mv="urn:schemas-microsoft-com:mac:vml" xmlns:mc="http://schemas.openxmlformats.org/markup-compatibility/2006" userId="Eva" providerId="None"/>
+        <p15:presenceInfo xmlns:p15="http://schemas.microsoft.com/office/powerpoint/2012/main" userId="Eva" providerId="None"/>
       </p:ext>
     </p:extLst>
   </p:cmAuthor>
@@ -153,7 +153,7 @@
 </file>
 
 <file path=ppt/notesMasters/notesMaster1.xml><?xml version="1.0" encoding="utf-8"?>
-<p:notesMaster xmlns:a="http://schemas.openxmlformats.org/drawingml/2006/main" xmlns:r="http://schemas.openxmlformats.org/officeDocument/2006/relationships" xmlns:mc="http://schemas.openxmlformats.org/markup-compatibility/2006" xmlns:mv="urn:schemas-microsoft-com:mac:vml" xmlns:p="http://schemas.openxmlformats.org/presentationml/2006/main" mc:Ignorable="mv" mc:PreserveAttributes="mv:*">
+<p:notesMaster xmlns:a="http://schemas.openxmlformats.org/drawingml/2006/main" xmlns:r="http://schemas.openxmlformats.org/officeDocument/2006/relationships" xmlns:p="http://schemas.openxmlformats.org/presentationml/2006/main">
   <p:cSld>
     <p:bg>
       <p:bgRef idx="1001">
@@ -235,7 +235,7 @@
             <a:fld id="{12320EBB-C57D-4679-B90E-3AE205263646}" type="datetimeFigureOut">
               <a:rPr lang="en-US" smtClean="0"/>
               <a:pPr/>
-              <a:t>5/8/15</a:t>
+              <a:t>11-May-15</a:t>
             </a:fld>
             <a:endParaRPr lang="en-US" dirty="0"/>
           </a:p>
@@ -404,7 +404,7 @@
     </p:spTree>
     <p:extLst>
       <p:ext uri="{BB962C8B-B14F-4D97-AF65-F5344CB8AC3E}">
-        <p14:creationId xmlns="" xmlns:a="http://schemas.openxmlformats.org/drawingml/2006/main" xmlns:r="http://schemas.openxmlformats.org/officeDocument/2006/relationships" xmlns:p="http://schemas.openxmlformats.org/presentationml/2006/main" xmlns:p14="http://schemas.microsoft.com/office/powerpoint/2010/main" xmlns:mv="urn:schemas-microsoft-com:mac:vml" xmlns:mc="http://schemas.openxmlformats.org/markup-compatibility/2006" val="2700682020"/>
+        <p14:creationId xmlns:p14="http://schemas.microsoft.com/office/powerpoint/2010/main" val="2700682020"/>
       </p:ext>
     </p:extLst>
   </p:cSld>
@@ -505,7 +505,7 @@
 </file>
 
 <file path=ppt/notesSlides/notesSlide1.xml><?xml version="1.0" encoding="utf-8"?>
-<p:notes xmlns:a="http://schemas.openxmlformats.org/drawingml/2006/main" xmlns:r="http://schemas.openxmlformats.org/officeDocument/2006/relationships" xmlns:mc="http://schemas.openxmlformats.org/markup-compatibility/2006" xmlns:mv="urn:schemas-microsoft-com:mac:vml" xmlns:p="http://schemas.openxmlformats.org/presentationml/2006/main" mc:Ignorable="mv" mc:PreserveAttributes="mv:*">
+<p:notes xmlns:a="http://schemas.openxmlformats.org/drawingml/2006/main" xmlns:r="http://schemas.openxmlformats.org/officeDocument/2006/relationships" xmlns:p="http://schemas.openxmlformats.org/presentationml/2006/main">
   <p:cSld>
     <p:spTree>
       <p:nvGrpSpPr>
@@ -548,41 +548,6 @@
           <a:bodyPr/>
           <a:lstStyle/>
           <a:p>
-            <a:r>
-              <a:rPr lang="en-US" dirty="0" smtClean="0"/>
-              <a:t>Open</a:t>
-            </a:r>
-            <a:r>
-              <a:rPr lang="en-US" baseline="0" dirty="0" smtClean="0"/>
-              <a:t> SmartGit and while there do the following</a:t>
-            </a:r>
-          </a:p>
-          <a:p>
-            <a:r>
-              <a:rPr lang="en-US" baseline="0" dirty="0" smtClean="0"/>
-              <a:t>Step 1: Click on Clone / New to bring up the dialogue box “Clone / Add / Create Repository”</a:t>
-            </a:r>
-          </a:p>
-          <a:p>
-            <a:r>
-              <a:rPr lang="en-US" baseline="0" dirty="0" smtClean="0"/>
-              <a:t>Step 2: Click on the most right icon opposite “Source Path/ URL”. This will take you to a list of your online repositories under your username. While there pick the repository you want to clone</a:t>
-            </a:r>
-          </a:p>
-          <a:p>
-            <a:r>
-              <a:rPr lang="en-US" baseline="0" dirty="0" smtClean="0"/>
-              <a:t>Step 3: Click on the most right icon opposite “Destination Path”. This will help you choose a local folder on your machine where you want to host the repository. This folder MUST be empty else you will receive an error message</a:t>
-            </a:r>
-          </a:p>
-          <a:p>
-            <a:endParaRPr lang="en-US" baseline="0" dirty="0" smtClean="0"/>
-          </a:p>
-          <a:p>
-            <a:r>
-              <a:rPr lang="en-US" baseline="0" dirty="0" smtClean="0"/>
-              <a:t>After process to click on Clone</a:t>
-            </a:r>
             <a:endParaRPr lang="en-US" dirty="0"/>
           </a:p>
         </p:txBody>
@@ -614,7 +579,7 @@
     </p:spTree>
     <p:extLst>
       <p:ext uri="{BB962C8B-B14F-4D97-AF65-F5344CB8AC3E}">
-        <p14:creationId xmlns="" xmlns:a="http://schemas.openxmlformats.org/drawingml/2006/main" xmlns:r="http://schemas.openxmlformats.org/officeDocument/2006/relationships" xmlns:p="http://schemas.openxmlformats.org/presentationml/2006/main" xmlns:p14="http://schemas.microsoft.com/office/powerpoint/2010/main" xmlns:mv="urn:schemas-microsoft-com:mac:vml" xmlns:mc="http://schemas.openxmlformats.org/markup-compatibility/2006" val="3125911225"/>
+        <p14:creationId xmlns:p14="http://schemas.microsoft.com/office/powerpoint/2010/main" val="3125911225"/>
       </p:ext>
     </p:extLst>
   </p:cSld>
@@ -625,7 +590,7 @@
 </file>
 
 <file path=ppt/notesSlides/notesSlide2.xml><?xml version="1.0" encoding="utf-8"?>
-<p:notes xmlns:a="http://schemas.openxmlformats.org/drawingml/2006/main" xmlns:r="http://schemas.openxmlformats.org/officeDocument/2006/relationships" xmlns:mc="http://schemas.openxmlformats.org/markup-compatibility/2006" xmlns:mv="urn:schemas-microsoft-com:mac:vml" xmlns:p="http://schemas.openxmlformats.org/presentationml/2006/main" mc:Ignorable="mv" mc:PreserveAttributes="mv:*">
+<p:notes xmlns:a="http://schemas.openxmlformats.org/drawingml/2006/main" xmlns:r="http://schemas.openxmlformats.org/officeDocument/2006/relationships" xmlns:p="http://schemas.openxmlformats.org/presentationml/2006/main">
   <p:cSld>
     <p:spTree>
       <p:nvGrpSpPr>
@@ -703,7 +668,7 @@
     </p:spTree>
     <p:extLst>
       <p:ext uri="{BB962C8B-B14F-4D97-AF65-F5344CB8AC3E}">
-        <p14:creationId xmlns="" xmlns:a="http://schemas.openxmlformats.org/drawingml/2006/main" xmlns:r="http://schemas.openxmlformats.org/officeDocument/2006/relationships" xmlns:p="http://schemas.openxmlformats.org/presentationml/2006/main" xmlns:p14="http://schemas.microsoft.com/office/powerpoint/2010/main" xmlns:mv="urn:schemas-microsoft-com:mac:vml" xmlns:mc="http://schemas.openxmlformats.org/markup-compatibility/2006" val="639080925"/>
+        <p14:creationId xmlns:p14="http://schemas.microsoft.com/office/powerpoint/2010/main" val="639080925"/>
       </p:ext>
     </p:extLst>
   </p:cSld>
@@ -714,7 +679,7 @@
 </file>
 
 <file path=ppt/slideLayouts/slideLayout1.xml><?xml version="1.0" encoding="utf-8"?>
-<p:sldLayout xmlns:a="http://schemas.openxmlformats.org/drawingml/2006/main" xmlns:r="http://schemas.openxmlformats.org/officeDocument/2006/relationships" xmlns:mc="http://schemas.openxmlformats.org/markup-compatibility/2006" xmlns:mv="urn:schemas-microsoft-com:mac:vml" xmlns:p="http://schemas.openxmlformats.org/presentationml/2006/main" mc:Ignorable="mv" mc:PreserveAttributes="mv:*" showMasterSp="0" type="title" preserve="1">
+<p:sldLayout xmlns:a="http://schemas.openxmlformats.org/drawingml/2006/main" xmlns:r="http://schemas.openxmlformats.org/officeDocument/2006/relationships" xmlns:p="http://schemas.openxmlformats.org/presentationml/2006/main" showMasterSp="0" type="title" preserve="1">
   <p:cSld name="Title Slide">
     <p:spTree>
       <p:nvGrpSpPr>
@@ -1436,7 +1401,7 @@
             <a:fld id="{89585FB9-3804-4F2F-A432-68920AB06FD5}" type="datetimeFigureOut">
               <a:rPr lang="en-US" smtClean="0"/>
               <a:pPr/>
-              <a:t>5/8/15</a:t>
+              <a:t>11-May-15</a:t>
             </a:fld>
             <a:endParaRPr lang="en-US" dirty="0"/>
           </a:p>
@@ -1488,7 +1453,7 @@
     </p:spTree>
     <p:extLst>
       <p:ext uri="{BB962C8B-B14F-4D97-AF65-F5344CB8AC3E}">
-        <p14:creationId xmlns="" xmlns:a="http://schemas.openxmlformats.org/drawingml/2006/main" xmlns:r="http://schemas.openxmlformats.org/officeDocument/2006/relationships" xmlns:p="http://schemas.openxmlformats.org/presentationml/2006/main" xmlns:p14="http://schemas.microsoft.com/office/powerpoint/2010/main" xmlns:mv="urn:schemas-microsoft-com:mac:vml" xmlns:mc="http://schemas.openxmlformats.org/markup-compatibility/2006" val="2241209880"/>
+        <p14:creationId xmlns:p14="http://schemas.microsoft.com/office/powerpoint/2010/main" val="2241209880"/>
       </p:ext>
     </p:extLst>
   </p:cSld>
@@ -1499,7 +1464,7 @@
 </file>
 
 <file path=ppt/slideLayouts/slideLayout10.xml><?xml version="1.0" encoding="utf-8"?>
-<p:sldLayout xmlns:a="http://schemas.openxmlformats.org/drawingml/2006/main" xmlns:r="http://schemas.openxmlformats.org/officeDocument/2006/relationships" xmlns:mc="http://schemas.openxmlformats.org/markup-compatibility/2006" xmlns:mv="urn:schemas-microsoft-com:mac:vml" xmlns:p="http://schemas.openxmlformats.org/presentationml/2006/main" mc:Ignorable="mv" mc:PreserveAttributes="mv:*" preserve="1">
+<p:sldLayout xmlns:a="http://schemas.openxmlformats.org/drawingml/2006/main" xmlns:r="http://schemas.openxmlformats.org/officeDocument/2006/relationships" xmlns:p="http://schemas.openxmlformats.org/presentationml/2006/main" preserve="1">
   <p:cSld name="Title and Caption">
     <p:spTree>
       <p:nvGrpSpPr>
@@ -1689,7 +1654,7 @@
             <a:fld id="{89585FB9-3804-4F2F-A432-68920AB06FD5}" type="datetimeFigureOut">
               <a:rPr lang="en-US" smtClean="0"/>
               <a:pPr/>
-              <a:t>5/8/15</a:t>
+              <a:t>11-May-15</a:t>
             </a:fld>
             <a:endParaRPr lang="en-US" dirty="0"/>
           </a:p>
@@ -1741,7 +1706,7 @@
     </p:spTree>
     <p:extLst>
       <p:ext uri="{BB962C8B-B14F-4D97-AF65-F5344CB8AC3E}">
-        <p14:creationId xmlns="" xmlns:a="http://schemas.openxmlformats.org/drawingml/2006/main" xmlns:r="http://schemas.openxmlformats.org/officeDocument/2006/relationships" xmlns:p="http://schemas.openxmlformats.org/presentationml/2006/main" xmlns:p14="http://schemas.microsoft.com/office/powerpoint/2010/main" xmlns:mv="urn:schemas-microsoft-com:mac:vml" xmlns:mc="http://schemas.openxmlformats.org/markup-compatibility/2006" val="2131812249"/>
+        <p14:creationId xmlns:p14="http://schemas.microsoft.com/office/powerpoint/2010/main" val="2131812249"/>
       </p:ext>
     </p:extLst>
   </p:cSld>
@@ -1752,7 +1717,7 @@
 </file>
 
 <file path=ppt/slideLayouts/slideLayout11.xml><?xml version="1.0" encoding="utf-8"?>
-<p:sldLayout xmlns:a="http://schemas.openxmlformats.org/drawingml/2006/main" xmlns:r="http://schemas.openxmlformats.org/officeDocument/2006/relationships" xmlns:mc="http://schemas.openxmlformats.org/markup-compatibility/2006" xmlns:mv="urn:schemas-microsoft-com:mac:vml" xmlns:p="http://schemas.openxmlformats.org/presentationml/2006/main" mc:Ignorable="mv" mc:PreserveAttributes="mv:*" preserve="1">
+<p:sldLayout xmlns:a="http://schemas.openxmlformats.org/drawingml/2006/main" xmlns:r="http://schemas.openxmlformats.org/officeDocument/2006/relationships" xmlns:p="http://schemas.openxmlformats.org/presentationml/2006/main" preserve="1">
   <p:cSld name="Quote with Caption">
     <p:spTree>
       <p:nvGrpSpPr>
@@ -2005,7 +1970,7 @@
             <a:fld id="{89585FB9-3804-4F2F-A432-68920AB06FD5}" type="datetimeFigureOut">
               <a:rPr lang="en-US" smtClean="0"/>
               <a:pPr/>
-              <a:t>5/8/15</a:t>
+              <a:t>11-May-15</a:t>
             </a:fld>
             <a:endParaRPr lang="en-US" dirty="0"/>
           </a:p>
@@ -2147,7 +2112,7 @@
     </p:spTree>
     <p:extLst>
       <p:ext uri="{BB962C8B-B14F-4D97-AF65-F5344CB8AC3E}">
-        <p14:creationId xmlns="" xmlns:a="http://schemas.openxmlformats.org/drawingml/2006/main" xmlns:r="http://schemas.openxmlformats.org/officeDocument/2006/relationships" xmlns:p="http://schemas.openxmlformats.org/presentationml/2006/main" xmlns:p14="http://schemas.microsoft.com/office/powerpoint/2010/main" xmlns:mv="urn:schemas-microsoft-com:mac:vml" xmlns:mc="http://schemas.openxmlformats.org/markup-compatibility/2006" val="2239895635"/>
+        <p14:creationId xmlns:p14="http://schemas.microsoft.com/office/powerpoint/2010/main" val="2239895635"/>
       </p:ext>
     </p:extLst>
   </p:cSld>
@@ -2158,7 +2123,7 @@
 </file>
 
 <file path=ppt/slideLayouts/slideLayout12.xml><?xml version="1.0" encoding="utf-8"?>
-<p:sldLayout xmlns:a="http://schemas.openxmlformats.org/drawingml/2006/main" xmlns:r="http://schemas.openxmlformats.org/officeDocument/2006/relationships" xmlns:mc="http://schemas.openxmlformats.org/markup-compatibility/2006" xmlns:mv="urn:schemas-microsoft-com:mac:vml" xmlns:p="http://schemas.openxmlformats.org/presentationml/2006/main" mc:Ignorable="mv" mc:PreserveAttributes="mv:*" preserve="1">
+<p:sldLayout xmlns:a="http://schemas.openxmlformats.org/drawingml/2006/main" xmlns:r="http://schemas.openxmlformats.org/officeDocument/2006/relationships" xmlns:p="http://schemas.openxmlformats.org/presentationml/2006/main" preserve="1">
   <p:cSld name="Name Card">
     <p:spTree>
       <p:nvGrpSpPr>
@@ -2348,7 +2313,7 @@
             <a:fld id="{89585FB9-3804-4F2F-A432-68920AB06FD5}" type="datetimeFigureOut">
               <a:rPr lang="en-US" smtClean="0"/>
               <a:pPr/>
-              <a:t>5/8/15</a:t>
+              <a:t>11-May-15</a:t>
             </a:fld>
             <a:endParaRPr lang="en-US" dirty="0"/>
           </a:p>
@@ -2400,7 +2365,7 @@
     </p:spTree>
     <p:extLst>
       <p:ext uri="{BB962C8B-B14F-4D97-AF65-F5344CB8AC3E}">
-        <p14:creationId xmlns="" xmlns:a="http://schemas.openxmlformats.org/drawingml/2006/main" xmlns:r="http://schemas.openxmlformats.org/officeDocument/2006/relationships" xmlns:p="http://schemas.openxmlformats.org/presentationml/2006/main" xmlns:p14="http://schemas.microsoft.com/office/powerpoint/2010/main" xmlns:mv="urn:schemas-microsoft-com:mac:vml" xmlns:mc="http://schemas.openxmlformats.org/markup-compatibility/2006" val="1147813802"/>
+        <p14:creationId xmlns:p14="http://schemas.microsoft.com/office/powerpoint/2010/main" val="1147813802"/>
       </p:ext>
     </p:extLst>
   </p:cSld>
@@ -2411,7 +2376,7 @@
 </file>
 
 <file path=ppt/slideLayouts/slideLayout13.xml><?xml version="1.0" encoding="utf-8"?>
-<p:sldLayout xmlns:a="http://schemas.openxmlformats.org/drawingml/2006/main" xmlns:r="http://schemas.openxmlformats.org/officeDocument/2006/relationships" xmlns:mc="http://schemas.openxmlformats.org/markup-compatibility/2006" xmlns:mv="urn:schemas-microsoft-com:mac:vml" xmlns:p="http://schemas.openxmlformats.org/presentationml/2006/main" mc:Ignorable="mv" mc:PreserveAttributes="mv:*" preserve="1">
+<p:sldLayout xmlns:a="http://schemas.openxmlformats.org/drawingml/2006/main" xmlns:r="http://schemas.openxmlformats.org/officeDocument/2006/relationships" xmlns:p="http://schemas.openxmlformats.org/presentationml/2006/main" preserve="1">
   <p:cSld name="Quote Name Card">
     <p:spTree>
       <p:nvGrpSpPr>
@@ -2664,7 +2629,7 @@
             <a:fld id="{89585FB9-3804-4F2F-A432-68920AB06FD5}" type="datetimeFigureOut">
               <a:rPr lang="en-US" smtClean="0"/>
               <a:pPr/>
-              <a:t>5/8/15</a:t>
+              <a:t>11-May-15</a:t>
             </a:fld>
             <a:endParaRPr lang="en-US" dirty="0"/>
           </a:p>
@@ -2798,7 +2763,7 @@
     </p:spTree>
     <p:extLst>
       <p:ext uri="{BB962C8B-B14F-4D97-AF65-F5344CB8AC3E}">
-        <p14:creationId xmlns="" xmlns:a="http://schemas.openxmlformats.org/drawingml/2006/main" xmlns:r="http://schemas.openxmlformats.org/officeDocument/2006/relationships" xmlns:p="http://schemas.openxmlformats.org/presentationml/2006/main" xmlns:p14="http://schemas.microsoft.com/office/powerpoint/2010/main" xmlns:mv="urn:schemas-microsoft-com:mac:vml" xmlns:mc="http://schemas.openxmlformats.org/markup-compatibility/2006" val="211510257"/>
+        <p14:creationId xmlns:p14="http://schemas.microsoft.com/office/powerpoint/2010/main" val="211510257"/>
       </p:ext>
     </p:extLst>
   </p:cSld>
@@ -2809,7 +2774,7 @@
 </file>
 
 <file path=ppt/slideLayouts/slideLayout14.xml><?xml version="1.0" encoding="utf-8"?>
-<p:sldLayout xmlns:a="http://schemas.openxmlformats.org/drawingml/2006/main" xmlns:r="http://schemas.openxmlformats.org/officeDocument/2006/relationships" xmlns:mc="http://schemas.openxmlformats.org/markup-compatibility/2006" xmlns:mv="urn:schemas-microsoft-com:mac:vml" xmlns:p="http://schemas.openxmlformats.org/presentationml/2006/main" mc:Ignorable="mv" mc:PreserveAttributes="mv:*" preserve="1">
+<p:sldLayout xmlns:a="http://schemas.openxmlformats.org/drawingml/2006/main" xmlns:r="http://schemas.openxmlformats.org/officeDocument/2006/relationships" xmlns:p="http://schemas.openxmlformats.org/presentationml/2006/main" preserve="1">
   <p:cSld name="True or False">
     <p:spTree>
       <p:nvGrpSpPr>
@@ -3059,7 +3024,7 @@
             <a:fld id="{89585FB9-3804-4F2F-A432-68920AB06FD5}" type="datetimeFigureOut">
               <a:rPr lang="en-US" smtClean="0"/>
               <a:pPr/>
-              <a:t>5/8/15</a:t>
+              <a:t>11-May-15</a:t>
             </a:fld>
             <a:endParaRPr lang="en-US" dirty="0"/>
           </a:p>
@@ -3111,7 +3076,7 @@
     </p:spTree>
     <p:extLst>
       <p:ext uri="{BB962C8B-B14F-4D97-AF65-F5344CB8AC3E}">
-        <p14:creationId xmlns="" xmlns:a="http://schemas.openxmlformats.org/drawingml/2006/main" xmlns:r="http://schemas.openxmlformats.org/officeDocument/2006/relationships" xmlns:p="http://schemas.openxmlformats.org/presentationml/2006/main" xmlns:p14="http://schemas.microsoft.com/office/powerpoint/2010/main" xmlns:mv="urn:schemas-microsoft-com:mac:vml" xmlns:mc="http://schemas.openxmlformats.org/markup-compatibility/2006" val="2904196083"/>
+        <p14:creationId xmlns:p14="http://schemas.microsoft.com/office/powerpoint/2010/main" val="2904196083"/>
       </p:ext>
     </p:extLst>
   </p:cSld>
@@ -3122,7 +3087,7 @@
 </file>
 
 <file path=ppt/slideLayouts/slideLayout15.xml><?xml version="1.0" encoding="utf-8"?>
-<p:sldLayout xmlns:a="http://schemas.openxmlformats.org/drawingml/2006/main" xmlns:r="http://schemas.openxmlformats.org/officeDocument/2006/relationships" xmlns:mc="http://schemas.openxmlformats.org/markup-compatibility/2006" xmlns:mv="urn:schemas-microsoft-com:mac:vml" xmlns:p="http://schemas.openxmlformats.org/presentationml/2006/main" mc:Ignorable="mv" mc:PreserveAttributes="mv:*" type="vertTx" preserve="1">
+<p:sldLayout xmlns:a="http://schemas.openxmlformats.org/drawingml/2006/main" xmlns:r="http://schemas.openxmlformats.org/officeDocument/2006/relationships" xmlns:p="http://schemas.openxmlformats.org/presentationml/2006/main" type="vertTx" preserve="1">
   <p:cSld name="Title and Vertical Text">
     <p:spTree>
       <p:nvGrpSpPr>
@@ -3231,7 +3196,7 @@
             <a:fld id="{89585FB9-3804-4F2F-A432-68920AB06FD5}" type="datetimeFigureOut">
               <a:rPr lang="en-US" smtClean="0"/>
               <a:pPr/>
-              <a:t>5/8/15</a:t>
+              <a:t>11-May-15</a:t>
             </a:fld>
             <a:endParaRPr lang="en-US" dirty="0"/>
           </a:p>
@@ -3283,7 +3248,7 @@
     </p:spTree>
     <p:extLst>
       <p:ext uri="{BB962C8B-B14F-4D97-AF65-F5344CB8AC3E}">
-        <p14:creationId xmlns="" xmlns:a="http://schemas.openxmlformats.org/drawingml/2006/main" xmlns:r="http://schemas.openxmlformats.org/officeDocument/2006/relationships" xmlns:p="http://schemas.openxmlformats.org/presentationml/2006/main" xmlns:p14="http://schemas.microsoft.com/office/powerpoint/2010/main" xmlns:mv="urn:schemas-microsoft-com:mac:vml" xmlns:mc="http://schemas.openxmlformats.org/markup-compatibility/2006" val="1254396012"/>
+        <p14:creationId xmlns:p14="http://schemas.microsoft.com/office/powerpoint/2010/main" val="1254396012"/>
       </p:ext>
     </p:extLst>
   </p:cSld>
@@ -3294,7 +3259,7 @@
 </file>
 
 <file path=ppt/slideLayouts/slideLayout16.xml><?xml version="1.0" encoding="utf-8"?>
-<p:sldLayout xmlns:a="http://schemas.openxmlformats.org/drawingml/2006/main" xmlns:r="http://schemas.openxmlformats.org/officeDocument/2006/relationships" xmlns:mc="http://schemas.openxmlformats.org/markup-compatibility/2006" xmlns:mv="urn:schemas-microsoft-com:mac:vml" xmlns:p="http://schemas.openxmlformats.org/presentationml/2006/main" mc:Ignorable="mv" mc:PreserveAttributes="mv:*" type="vertTitleAndTx" preserve="1">
+<p:sldLayout xmlns:a="http://schemas.openxmlformats.org/drawingml/2006/main" xmlns:r="http://schemas.openxmlformats.org/officeDocument/2006/relationships" xmlns:p="http://schemas.openxmlformats.org/presentationml/2006/main" type="vertTitleAndTx" preserve="1">
   <p:cSld name="Vertical Title and Text">
     <p:spTree>
       <p:nvGrpSpPr>
@@ -3413,7 +3378,7 @@
             <a:fld id="{89585FB9-3804-4F2F-A432-68920AB06FD5}" type="datetimeFigureOut">
               <a:rPr lang="en-US" smtClean="0"/>
               <a:pPr/>
-              <a:t>5/8/15</a:t>
+              <a:t>11-May-15</a:t>
             </a:fld>
             <a:endParaRPr lang="en-US" dirty="0"/>
           </a:p>
@@ -3465,7 +3430,7 @@
     </p:spTree>
     <p:extLst>
       <p:ext uri="{BB962C8B-B14F-4D97-AF65-F5344CB8AC3E}">
-        <p14:creationId xmlns="" xmlns:a="http://schemas.openxmlformats.org/drawingml/2006/main" xmlns:r="http://schemas.openxmlformats.org/officeDocument/2006/relationships" xmlns:p="http://schemas.openxmlformats.org/presentationml/2006/main" xmlns:p14="http://schemas.microsoft.com/office/powerpoint/2010/main" xmlns:mv="urn:schemas-microsoft-com:mac:vml" xmlns:mc="http://schemas.openxmlformats.org/markup-compatibility/2006" val="1959831598"/>
+        <p14:creationId xmlns:p14="http://schemas.microsoft.com/office/powerpoint/2010/main" val="1959831598"/>
       </p:ext>
     </p:extLst>
   </p:cSld>
@@ -3476,7 +3441,7 @@
 </file>
 
 <file path=ppt/slideLayouts/slideLayout2.xml><?xml version="1.0" encoding="utf-8"?>
-<p:sldLayout xmlns:a="http://schemas.openxmlformats.org/drawingml/2006/main" xmlns:r="http://schemas.openxmlformats.org/officeDocument/2006/relationships" xmlns:mc="http://schemas.openxmlformats.org/markup-compatibility/2006" xmlns:mv="urn:schemas-microsoft-com:mac:vml" xmlns:p="http://schemas.openxmlformats.org/presentationml/2006/main" mc:Ignorable="mv" mc:PreserveAttributes="mv:*" type="obj" preserve="1">
+<p:sldLayout xmlns:a="http://schemas.openxmlformats.org/drawingml/2006/main" xmlns:r="http://schemas.openxmlformats.org/officeDocument/2006/relationships" xmlns:p="http://schemas.openxmlformats.org/presentationml/2006/main" type="obj" preserve="1">
   <p:cSld name="Title and Content">
     <p:spTree>
       <p:nvGrpSpPr>
@@ -3591,7 +3556,7 @@
             <a:fld id="{89585FB9-3804-4F2F-A432-68920AB06FD5}" type="datetimeFigureOut">
               <a:rPr lang="en-US" smtClean="0"/>
               <a:pPr/>
-              <a:t>5/8/15</a:t>
+              <a:t>11-May-15</a:t>
             </a:fld>
             <a:endParaRPr lang="en-US" dirty="0"/>
           </a:p>
@@ -3643,7 +3608,7 @@
     </p:spTree>
     <p:extLst>
       <p:ext uri="{BB962C8B-B14F-4D97-AF65-F5344CB8AC3E}">
-        <p14:creationId xmlns="" xmlns:a="http://schemas.openxmlformats.org/drawingml/2006/main" xmlns:r="http://schemas.openxmlformats.org/officeDocument/2006/relationships" xmlns:p="http://schemas.openxmlformats.org/presentationml/2006/main" xmlns:p14="http://schemas.microsoft.com/office/powerpoint/2010/main" xmlns:mv="urn:schemas-microsoft-com:mac:vml" xmlns:mc="http://schemas.openxmlformats.org/markup-compatibility/2006" val="1037308338"/>
+        <p14:creationId xmlns:p14="http://schemas.microsoft.com/office/powerpoint/2010/main" val="1037308338"/>
       </p:ext>
     </p:extLst>
   </p:cSld>
@@ -3654,7 +3619,7 @@
 </file>
 
 <file path=ppt/slideLayouts/slideLayout3.xml><?xml version="1.0" encoding="utf-8"?>
-<p:sldLayout xmlns:a="http://schemas.openxmlformats.org/drawingml/2006/main" xmlns:r="http://schemas.openxmlformats.org/officeDocument/2006/relationships" xmlns:mc="http://schemas.openxmlformats.org/markup-compatibility/2006" xmlns:mv="urn:schemas-microsoft-com:mac:vml" xmlns:p="http://schemas.openxmlformats.org/presentationml/2006/main" mc:Ignorable="mv" mc:PreserveAttributes="mv:*" type="secHead" preserve="1">
+<p:sldLayout xmlns:a="http://schemas.openxmlformats.org/drawingml/2006/main" xmlns:r="http://schemas.openxmlformats.org/officeDocument/2006/relationships" xmlns:p="http://schemas.openxmlformats.org/presentationml/2006/main" type="secHead" preserve="1">
   <p:cSld name="Section Header">
     <p:spTree>
       <p:nvGrpSpPr>
@@ -3840,7 +3805,7 @@
             <a:fld id="{89585FB9-3804-4F2F-A432-68920AB06FD5}" type="datetimeFigureOut">
               <a:rPr lang="en-US" smtClean="0"/>
               <a:pPr/>
-              <a:t>5/8/15</a:t>
+              <a:t>11-May-15</a:t>
             </a:fld>
             <a:endParaRPr lang="en-US" dirty="0"/>
           </a:p>
@@ -3892,7 +3857,7 @@
     </p:spTree>
     <p:extLst>
       <p:ext uri="{BB962C8B-B14F-4D97-AF65-F5344CB8AC3E}">
-        <p14:creationId xmlns="" xmlns:a="http://schemas.openxmlformats.org/drawingml/2006/main" xmlns:r="http://schemas.openxmlformats.org/officeDocument/2006/relationships" xmlns:p="http://schemas.openxmlformats.org/presentationml/2006/main" xmlns:p14="http://schemas.microsoft.com/office/powerpoint/2010/main" xmlns:mv="urn:schemas-microsoft-com:mac:vml" xmlns:mc="http://schemas.openxmlformats.org/markup-compatibility/2006" val="1433787486"/>
+        <p14:creationId xmlns:p14="http://schemas.microsoft.com/office/powerpoint/2010/main" val="1433787486"/>
       </p:ext>
     </p:extLst>
   </p:cSld>
@@ -3903,7 +3868,7 @@
 </file>
 
 <file path=ppt/slideLayouts/slideLayout4.xml><?xml version="1.0" encoding="utf-8"?>
-<p:sldLayout xmlns:a="http://schemas.openxmlformats.org/drawingml/2006/main" xmlns:r="http://schemas.openxmlformats.org/officeDocument/2006/relationships" xmlns:mc="http://schemas.openxmlformats.org/markup-compatibility/2006" xmlns:mv="urn:schemas-microsoft-com:mac:vml" xmlns:p="http://schemas.openxmlformats.org/presentationml/2006/main" mc:Ignorable="mv" mc:PreserveAttributes="mv:*" type="twoObj" preserve="1">
+<p:sldLayout xmlns:a="http://schemas.openxmlformats.org/drawingml/2006/main" xmlns:r="http://schemas.openxmlformats.org/officeDocument/2006/relationships" xmlns:p="http://schemas.openxmlformats.org/presentationml/2006/main" type="twoObj" preserve="1">
   <p:cSld name="Two Content">
     <p:spTree>
       <p:nvGrpSpPr>
@@ -4074,7 +4039,7 @@
             <a:fld id="{89585FB9-3804-4F2F-A432-68920AB06FD5}" type="datetimeFigureOut">
               <a:rPr lang="en-US" smtClean="0"/>
               <a:pPr/>
-              <a:t>5/8/15</a:t>
+              <a:t>11-May-15</a:t>
             </a:fld>
             <a:endParaRPr lang="en-US" dirty="0"/>
           </a:p>
@@ -4126,7 +4091,7 @@
     </p:spTree>
     <p:extLst>
       <p:ext uri="{BB962C8B-B14F-4D97-AF65-F5344CB8AC3E}">
-        <p14:creationId xmlns="" xmlns:a="http://schemas.openxmlformats.org/drawingml/2006/main" xmlns:r="http://schemas.openxmlformats.org/officeDocument/2006/relationships" xmlns:p="http://schemas.openxmlformats.org/presentationml/2006/main" xmlns:p14="http://schemas.microsoft.com/office/powerpoint/2010/main" xmlns:mv="urn:schemas-microsoft-com:mac:vml" xmlns:mc="http://schemas.openxmlformats.org/markup-compatibility/2006" val="3343638220"/>
+        <p14:creationId xmlns:p14="http://schemas.microsoft.com/office/powerpoint/2010/main" val="3343638220"/>
       </p:ext>
     </p:extLst>
   </p:cSld>
@@ -4137,7 +4102,7 @@
 </file>
 
 <file path=ppt/slideLayouts/slideLayout5.xml><?xml version="1.0" encoding="utf-8"?>
-<p:sldLayout xmlns:a="http://schemas.openxmlformats.org/drawingml/2006/main" xmlns:r="http://schemas.openxmlformats.org/officeDocument/2006/relationships" xmlns:mc="http://schemas.openxmlformats.org/markup-compatibility/2006" xmlns:mv="urn:schemas-microsoft-com:mac:vml" xmlns:p="http://schemas.openxmlformats.org/presentationml/2006/main" mc:Ignorable="mv" mc:PreserveAttributes="mv:*" type="twoTxTwoObj" preserve="1">
+<p:sldLayout xmlns:a="http://schemas.openxmlformats.org/drawingml/2006/main" xmlns:r="http://schemas.openxmlformats.org/officeDocument/2006/relationships" xmlns:p="http://schemas.openxmlformats.org/presentationml/2006/main" type="twoTxTwoObj" preserve="1">
   <p:cSld name="Comparison">
     <p:spTree>
       <p:nvGrpSpPr>
@@ -4450,7 +4415,7 @@
             <a:fld id="{89585FB9-3804-4F2F-A432-68920AB06FD5}" type="datetimeFigureOut">
               <a:rPr lang="en-US" smtClean="0"/>
               <a:pPr/>
-              <a:t>5/8/15</a:t>
+              <a:t>11-May-15</a:t>
             </a:fld>
             <a:endParaRPr lang="en-US" dirty="0"/>
           </a:p>
@@ -4502,7 +4467,7 @@
     </p:spTree>
     <p:extLst>
       <p:ext uri="{BB962C8B-B14F-4D97-AF65-F5344CB8AC3E}">
-        <p14:creationId xmlns="" xmlns:a="http://schemas.openxmlformats.org/drawingml/2006/main" xmlns:r="http://schemas.openxmlformats.org/officeDocument/2006/relationships" xmlns:p="http://schemas.openxmlformats.org/presentationml/2006/main" xmlns:p14="http://schemas.microsoft.com/office/powerpoint/2010/main" xmlns:mv="urn:schemas-microsoft-com:mac:vml" xmlns:mc="http://schemas.openxmlformats.org/markup-compatibility/2006" val="3657773564"/>
+        <p14:creationId xmlns:p14="http://schemas.microsoft.com/office/powerpoint/2010/main" val="3657773564"/>
       </p:ext>
     </p:extLst>
   </p:cSld>
@@ -4513,7 +4478,7 @@
 </file>
 
 <file path=ppt/slideLayouts/slideLayout6.xml><?xml version="1.0" encoding="utf-8"?>
-<p:sldLayout xmlns:a="http://schemas.openxmlformats.org/drawingml/2006/main" xmlns:r="http://schemas.openxmlformats.org/officeDocument/2006/relationships" xmlns:mc="http://schemas.openxmlformats.org/markup-compatibility/2006" xmlns:mv="urn:schemas-microsoft-com:mac:vml" xmlns:p="http://schemas.openxmlformats.org/presentationml/2006/main" mc:Ignorable="mv" mc:PreserveAttributes="mv:*" type="titleOnly" preserve="1">
+<p:sldLayout xmlns:a="http://schemas.openxmlformats.org/drawingml/2006/main" xmlns:r="http://schemas.openxmlformats.org/officeDocument/2006/relationships" xmlns:p="http://schemas.openxmlformats.org/presentationml/2006/main" type="titleOnly" preserve="1">
   <p:cSld name="Title Only">
     <p:spTree>
       <p:nvGrpSpPr>
@@ -4575,7 +4540,7 @@
             <a:fld id="{89585FB9-3804-4F2F-A432-68920AB06FD5}" type="datetimeFigureOut">
               <a:rPr lang="en-US" smtClean="0"/>
               <a:pPr/>
-              <a:t>5/8/15</a:t>
+              <a:t>11-May-15</a:t>
             </a:fld>
             <a:endParaRPr lang="en-US" dirty="0"/>
           </a:p>
@@ -4627,7 +4592,7 @@
     </p:spTree>
     <p:extLst>
       <p:ext uri="{BB962C8B-B14F-4D97-AF65-F5344CB8AC3E}">
-        <p14:creationId xmlns="" xmlns:a="http://schemas.openxmlformats.org/drawingml/2006/main" xmlns:r="http://schemas.openxmlformats.org/officeDocument/2006/relationships" xmlns:p="http://schemas.openxmlformats.org/presentationml/2006/main" xmlns:p14="http://schemas.microsoft.com/office/powerpoint/2010/main" xmlns:mv="urn:schemas-microsoft-com:mac:vml" xmlns:mc="http://schemas.openxmlformats.org/markup-compatibility/2006" val="1859816651"/>
+        <p14:creationId xmlns:p14="http://schemas.microsoft.com/office/powerpoint/2010/main" val="1859816651"/>
       </p:ext>
     </p:extLst>
   </p:cSld>
@@ -4638,7 +4603,7 @@
 </file>
 
 <file path=ppt/slideLayouts/slideLayout7.xml><?xml version="1.0" encoding="utf-8"?>
-<p:sldLayout xmlns:a="http://schemas.openxmlformats.org/drawingml/2006/main" xmlns:r="http://schemas.openxmlformats.org/officeDocument/2006/relationships" xmlns:mc="http://schemas.openxmlformats.org/markup-compatibility/2006" xmlns:mv="urn:schemas-microsoft-com:mac:vml" xmlns:p="http://schemas.openxmlformats.org/presentationml/2006/main" mc:Ignorable="mv" mc:PreserveAttributes="mv:*" type="blank" preserve="1">
+<p:sldLayout xmlns:a="http://schemas.openxmlformats.org/drawingml/2006/main" xmlns:r="http://schemas.openxmlformats.org/officeDocument/2006/relationships" xmlns:p="http://schemas.openxmlformats.org/presentationml/2006/main" type="blank" preserve="1">
   <p:cSld name="Blank">
     <p:spTree>
       <p:nvGrpSpPr>
@@ -4672,7 +4637,7 @@
             <a:fld id="{89585FB9-3804-4F2F-A432-68920AB06FD5}" type="datetimeFigureOut">
               <a:rPr lang="en-US" smtClean="0"/>
               <a:pPr/>
-              <a:t>5/8/15</a:t>
+              <a:t>11-May-15</a:t>
             </a:fld>
             <a:endParaRPr lang="en-US" dirty="0"/>
           </a:p>
@@ -4724,7 +4689,7 @@
     </p:spTree>
     <p:extLst>
       <p:ext uri="{BB962C8B-B14F-4D97-AF65-F5344CB8AC3E}">
-        <p14:creationId xmlns="" xmlns:a="http://schemas.openxmlformats.org/drawingml/2006/main" xmlns:r="http://schemas.openxmlformats.org/officeDocument/2006/relationships" xmlns:p="http://schemas.openxmlformats.org/presentationml/2006/main" xmlns:p14="http://schemas.microsoft.com/office/powerpoint/2010/main" xmlns:mv="urn:schemas-microsoft-com:mac:vml" xmlns:mc="http://schemas.openxmlformats.org/markup-compatibility/2006" val="3429186225"/>
+        <p14:creationId xmlns:p14="http://schemas.microsoft.com/office/powerpoint/2010/main" val="3429186225"/>
       </p:ext>
     </p:extLst>
   </p:cSld>
@@ -4735,7 +4700,7 @@
 </file>
 
 <file path=ppt/slideLayouts/slideLayout8.xml><?xml version="1.0" encoding="utf-8"?>
-<p:sldLayout xmlns:a="http://schemas.openxmlformats.org/drawingml/2006/main" xmlns:r="http://schemas.openxmlformats.org/officeDocument/2006/relationships" xmlns:mc="http://schemas.openxmlformats.org/markup-compatibility/2006" xmlns:mv="urn:schemas-microsoft-com:mac:vml" xmlns:p="http://schemas.openxmlformats.org/presentationml/2006/main" mc:Ignorable="mv" mc:PreserveAttributes="mv:*" type="objTx" preserve="1">
+<p:sldLayout xmlns:a="http://schemas.openxmlformats.org/drawingml/2006/main" xmlns:r="http://schemas.openxmlformats.org/officeDocument/2006/relationships" xmlns:p="http://schemas.openxmlformats.org/presentationml/2006/main" type="objTx" preserve="1">
   <p:cSld name="Content with Caption">
     <p:spTree>
       <p:nvGrpSpPr>
@@ -4929,7 +4894,7 @@
             <a:fld id="{89585FB9-3804-4F2F-A432-68920AB06FD5}" type="datetimeFigureOut">
               <a:rPr lang="en-US" smtClean="0"/>
               <a:pPr/>
-              <a:t>5/8/15</a:t>
+              <a:t>11-May-15</a:t>
             </a:fld>
             <a:endParaRPr lang="en-US" dirty="0"/>
           </a:p>
@@ -4981,7 +4946,7 @@
     </p:spTree>
     <p:extLst>
       <p:ext uri="{BB962C8B-B14F-4D97-AF65-F5344CB8AC3E}">
-        <p14:creationId xmlns="" xmlns:a="http://schemas.openxmlformats.org/drawingml/2006/main" xmlns:r="http://schemas.openxmlformats.org/officeDocument/2006/relationships" xmlns:p="http://schemas.openxmlformats.org/presentationml/2006/main" xmlns:p14="http://schemas.microsoft.com/office/powerpoint/2010/main" xmlns:mv="urn:schemas-microsoft-com:mac:vml" xmlns:mc="http://schemas.openxmlformats.org/markup-compatibility/2006" val="2720025707"/>
+        <p14:creationId xmlns:p14="http://schemas.microsoft.com/office/powerpoint/2010/main" val="2720025707"/>
       </p:ext>
     </p:extLst>
   </p:cSld>
@@ -4992,7 +4957,7 @@
 </file>
 
 <file path=ppt/slideLayouts/slideLayout9.xml><?xml version="1.0" encoding="utf-8"?>
-<p:sldLayout xmlns:a="http://schemas.openxmlformats.org/drawingml/2006/main" xmlns:r="http://schemas.openxmlformats.org/officeDocument/2006/relationships" xmlns:mc="http://schemas.openxmlformats.org/markup-compatibility/2006" xmlns:mv="urn:schemas-microsoft-com:mac:vml" xmlns:p="http://schemas.openxmlformats.org/presentationml/2006/main" mc:Ignorable="mv" mc:PreserveAttributes="mv:*" type="picTx" preserve="1">
+<p:sldLayout xmlns:a="http://schemas.openxmlformats.org/drawingml/2006/main" xmlns:r="http://schemas.openxmlformats.org/officeDocument/2006/relationships" xmlns:p="http://schemas.openxmlformats.org/presentationml/2006/main" type="picTx" preserve="1">
   <p:cSld name="Picture with Caption">
     <p:spTree>
       <p:nvGrpSpPr>
@@ -5194,7 +5159,7 @@
             <a:fld id="{89585FB9-3804-4F2F-A432-68920AB06FD5}" type="datetimeFigureOut">
               <a:rPr lang="en-US" smtClean="0"/>
               <a:pPr/>
-              <a:t>5/8/15</a:t>
+              <a:t>11-May-15</a:t>
             </a:fld>
             <a:endParaRPr lang="en-US" dirty="0"/>
           </a:p>
@@ -5246,7 +5211,7 @@
     </p:spTree>
     <p:extLst>
       <p:ext uri="{BB962C8B-B14F-4D97-AF65-F5344CB8AC3E}">
-        <p14:creationId xmlns="" xmlns:a="http://schemas.openxmlformats.org/drawingml/2006/main" xmlns:r="http://schemas.openxmlformats.org/officeDocument/2006/relationships" xmlns:p="http://schemas.openxmlformats.org/presentationml/2006/main" xmlns:p14="http://schemas.microsoft.com/office/powerpoint/2010/main" xmlns:mv="urn:schemas-microsoft-com:mac:vml" xmlns:mc="http://schemas.openxmlformats.org/markup-compatibility/2006" val="2613492434"/>
+        <p14:creationId xmlns:p14="http://schemas.microsoft.com/office/powerpoint/2010/main" val="2613492434"/>
       </p:ext>
     </p:extLst>
   </p:cSld>
@@ -5257,7 +5222,7 @@
 </file>
 
 <file path=ppt/slideMasters/slideMaster1.xml><?xml version="1.0" encoding="utf-8"?>
-<p:sldMaster xmlns:a="http://schemas.openxmlformats.org/drawingml/2006/main" xmlns:r="http://schemas.openxmlformats.org/officeDocument/2006/relationships" xmlns:mc="http://schemas.openxmlformats.org/markup-compatibility/2006" xmlns:mv="urn:schemas-microsoft-com:mac:vml" xmlns:p="http://schemas.openxmlformats.org/presentationml/2006/main" mc:Ignorable="mv" mc:PreserveAttributes="mv:*">
+<p:sldMaster xmlns:a="http://schemas.openxmlformats.org/drawingml/2006/main" xmlns:r="http://schemas.openxmlformats.org/officeDocument/2006/relationships" xmlns:p="http://schemas.openxmlformats.org/presentationml/2006/main">
   <p:cSld>
     <p:bg>
       <p:bgRef idx="1001">
@@ -5939,7 +5904,7 @@
             <a:fld id="{89585FB9-3804-4F2F-A432-68920AB06FD5}" type="datetimeFigureOut">
               <a:rPr lang="en-US" smtClean="0"/>
               <a:pPr/>
-              <a:t>5/8/15</a:t>
+              <a:t>11-May-15</a:t>
             </a:fld>
             <a:endParaRPr lang="en-US" dirty="0"/>
           </a:p>
@@ -6025,7 +5990,7 @@
     </p:spTree>
     <p:extLst>
       <p:ext uri="{BB962C8B-B14F-4D97-AF65-F5344CB8AC3E}">
-        <p14:creationId xmlns="" xmlns:a="http://schemas.openxmlformats.org/drawingml/2006/main" xmlns:r="http://schemas.openxmlformats.org/officeDocument/2006/relationships" xmlns:p="http://schemas.openxmlformats.org/presentationml/2006/main" xmlns:p14="http://schemas.microsoft.com/office/powerpoint/2010/main" xmlns:mv="urn:schemas-microsoft-com:mac:vml" xmlns:mc="http://schemas.openxmlformats.org/markup-compatibility/2006" val="4009987634"/>
+        <p14:creationId xmlns:p14="http://schemas.microsoft.com/office/powerpoint/2010/main" val="4009987634"/>
       </p:ext>
     </p:extLst>
   </p:cSld>
@@ -6448,7 +6413,7 @@
 </file>
 
 <file path=ppt/slides/slide1.xml><?xml version="1.0" encoding="utf-8"?>
-<p:sld xmlns:a="http://schemas.openxmlformats.org/drawingml/2006/main" xmlns:r="http://schemas.openxmlformats.org/officeDocument/2006/relationships" xmlns:mc="http://schemas.openxmlformats.org/markup-compatibility/2006" xmlns:mv="urn:schemas-microsoft-com:mac:vml" xmlns:p="http://schemas.openxmlformats.org/presentationml/2006/main" mc:Ignorable="mv" mc:PreserveAttributes="mv:*">
+<p:sld xmlns:a="http://schemas.openxmlformats.org/drawingml/2006/main" xmlns:r="http://schemas.openxmlformats.org/officeDocument/2006/relationships" xmlns:p="http://schemas.openxmlformats.org/presentationml/2006/main">
   <p:cSld>
     <p:spTree>
       <p:nvGrpSpPr>
@@ -6540,7 +6505,7 @@
     </p:spTree>
     <p:extLst>
       <p:ext uri="{BB962C8B-B14F-4D97-AF65-F5344CB8AC3E}">
-        <p14:creationId xmlns="" xmlns:a="http://schemas.openxmlformats.org/drawingml/2006/main" xmlns:r="http://schemas.openxmlformats.org/officeDocument/2006/relationships" xmlns:p="http://schemas.openxmlformats.org/presentationml/2006/main" xmlns:p14="http://schemas.microsoft.com/office/powerpoint/2010/main" xmlns:mv="urn:schemas-microsoft-com:mac:vml" xmlns:mc="http://schemas.openxmlformats.org/markup-compatibility/2006" val="3087260744"/>
+        <p14:creationId xmlns:p14="http://schemas.microsoft.com/office/powerpoint/2010/main" val="3087260744"/>
       </p:ext>
     </p:extLst>
   </p:cSld>
@@ -6558,7 +6523,7 @@
 </file>
 
 <file path=ppt/slides/slide2.xml><?xml version="1.0" encoding="utf-8"?>
-<p:sld xmlns:a="http://schemas.openxmlformats.org/drawingml/2006/main" xmlns:r="http://schemas.openxmlformats.org/officeDocument/2006/relationships" xmlns:mc="http://schemas.openxmlformats.org/markup-compatibility/2006" xmlns:mv="urn:schemas-microsoft-com:mac:vml" xmlns:p="http://schemas.openxmlformats.org/presentationml/2006/main" mc:Ignorable="mv" mc:PreserveAttributes="mv:*">
+<p:sld xmlns:a="http://schemas.openxmlformats.org/drawingml/2006/main" xmlns:r="http://schemas.openxmlformats.org/officeDocument/2006/relationships" xmlns:p="http://schemas.openxmlformats.org/presentationml/2006/main">
   <p:cSld>
     <p:spTree>
       <p:nvGrpSpPr>
@@ -6699,7 +6664,11 @@
             </a:r>
             <a:r>
               <a:rPr lang="en-ZA" sz="2400" dirty="0" smtClean="0"/>
-              <a:t>Creates a branch of a git repository.</a:t>
+              <a:t>Creates a branch of a git </a:t>
+            </a:r>
+            <a:r>
+              <a:rPr lang="en-ZA" sz="2400" dirty="0" smtClean="0"/>
+              <a:t>repository</a:t>
             </a:r>
             <a:endParaRPr lang="en-US" sz="2400" dirty="0"/>
           </a:p>
@@ -6718,7 +6687,11 @@
             </a:r>
             <a:r>
               <a:rPr lang="en-ZA" sz="2400" dirty="0" smtClean="0"/>
-              <a:t>Adds changes made on branched repository to the main/original repository.  </a:t>
+              <a:t>Adds changes made on branched repository to the main/original </a:t>
+            </a:r>
+            <a:r>
+              <a:rPr lang="en-ZA" sz="2400" dirty="0" smtClean="0"/>
+              <a:t>repository </a:t>
             </a:r>
             <a:endParaRPr lang="en-US" sz="2400" dirty="0"/>
           </a:p>
@@ -6737,7 +6710,11 @@
             </a:r>
             <a:r>
               <a:rPr lang="en-ZA" sz="2400" dirty="0" smtClean="0"/>
-              <a:t>Incorporates your local committed changes to the online GitHub repository. </a:t>
+              <a:t>Incorporates your local committed changes to the online GitHub </a:t>
+            </a:r>
+            <a:r>
+              <a:rPr lang="en-ZA" sz="2400" dirty="0" smtClean="0"/>
+              <a:t>repository </a:t>
             </a:r>
             <a:endParaRPr lang="en-US" sz="2400" dirty="0"/>
           </a:p>
@@ -6756,8 +6733,13 @@
             </a:r>
             <a:r>
               <a:rPr lang="en-ZA" sz="2400" dirty="0" smtClean="0"/>
-              <a:t>Incorporates the newest changes of an online repository, to your local repository. </a:t>
-            </a:r>
+              <a:t>Incorporates the newest changes of an online repository, to your local </a:t>
+            </a:r>
+            <a:r>
+              <a:rPr lang="en-ZA" sz="2400" dirty="0" smtClean="0"/>
+              <a:t>repository</a:t>
+            </a:r>
+            <a:endParaRPr lang="en-ZA" sz="2400" dirty="0" smtClean="0"/>
           </a:p>
           <a:p>
             <a:r>
@@ -6778,8 +6760,13 @@
             </a:r>
             <a:r>
               <a:rPr lang="en-ZA" sz="2400" dirty="0"/>
-              <a:t>want to check. </a:t>
-            </a:r>
+              <a:t>want to </a:t>
+            </a:r>
+            <a:r>
+              <a:rPr lang="en-ZA" sz="2400" dirty="0" smtClean="0"/>
+              <a:t>check </a:t>
+            </a:r>
+            <a:endParaRPr lang="en-ZA" sz="2400" dirty="0"/>
           </a:p>
           <a:p>
             <a:r>
@@ -6800,7 +6787,7 @@
             </a:r>
             <a:r>
               <a:rPr lang="en-ZA" sz="2400" dirty="0" smtClean="0"/>
-              <a:t>repository. </a:t>
+              <a:t>repository</a:t>
             </a:r>
             <a:endParaRPr lang="en-US" sz="2400" dirty="0"/>
           </a:p>
@@ -6812,7 +6799,7 @@
     </p:spTree>
     <p:extLst>
       <p:ext uri="{BB962C8B-B14F-4D97-AF65-F5344CB8AC3E}">
-        <p14:creationId xmlns="" xmlns:a="http://schemas.openxmlformats.org/drawingml/2006/main" xmlns:r="http://schemas.openxmlformats.org/officeDocument/2006/relationships" xmlns:p="http://schemas.openxmlformats.org/presentationml/2006/main" xmlns:p14="http://schemas.microsoft.com/office/powerpoint/2010/main" xmlns:mv="urn:schemas-microsoft-com:mac:vml" xmlns:mc="http://schemas.openxmlformats.org/markup-compatibility/2006" val="1691310875"/>
+        <p14:creationId xmlns:p14="http://schemas.microsoft.com/office/powerpoint/2010/main" val="1691310875"/>
       </p:ext>
     </p:extLst>
   </p:cSld>
@@ -6830,7 +6817,7 @@
 </file>
 
 <file path=ppt/slides/slide3.xml><?xml version="1.0" encoding="utf-8"?>
-<p:sld xmlns:a="http://schemas.openxmlformats.org/drawingml/2006/main" xmlns:r="http://schemas.openxmlformats.org/officeDocument/2006/relationships" xmlns:mc="http://schemas.openxmlformats.org/markup-compatibility/2006" xmlns:mv="urn:schemas-microsoft-com:mac:vml" xmlns:p="http://schemas.openxmlformats.org/presentationml/2006/main" mc:Ignorable="mv" mc:PreserveAttributes="mv:*">
+<p:sld xmlns:a="http://schemas.openxmlformats.org/drawingml/2006/main" xmlns:r="http://schemas.openxmlformats.org/officeDocument/2006/relationships" xmlns:p="http://schemas.openxmlformats.org/presentationml/2006/main">
   <p:cSld>
     <p:spTree>
       <p:nvGrpSpPr>
@@ -6941,8 +6928,13 @@
             </a:r>
             <a:r>
               <a:rPr lang="en-ZA" sz="2595" dirty="0" smtClean="0"/>
-              <a:t> and create a GitHub account.</a:t>
-            </a:r>
+              <a:t> and create a GitHub </a:t>
+            </a:r>
+            <a:r>
+              <a:rPr lang="en-ZA" sz="2595" dirty="0" smtClean="0"/>
+              <a:t>account</a:t>
+            </a:r>
+            <a:endParaRPr lang="en-ZA" sz="2595" dirty="0" smtClean="0"/>
           </a:p>
           <a:p>
             <a:pPr marL="0" indent="0">
@@ -6983,19 +6975,29 @@
             </a:r>
             <a:r>
               <a:rPr lang="en-US" sz="2595" u="sng" dirty="0"/>
-              <a:t>http://www.syntevo.com/smartgit/</a:t>
-            </a:r>
-            <a:r>
-              <a:rPr lang="en-ZA" sz="2595" dirty="0"/>
-              <a:t>. </a:t>
-            </a:r>
+              <a:t>http://www.syntevo.com/smartgit</a:t>
+            </a:r>
+            <a:r>
+              <a:rPr lang="en-US" sz="2595" u="sng" dirty="0" smtClean="0"/>
+              <a:t>/</a:t>
+            </a:r>
+            <a:r>
+              <a:rPr lang="en-ZA" sz="2595" dirty="0" smtClean="0"/>
+              <a:t> </a:t>
+            </a:r>
+            <a:endParaRPr lang="en-ZA" sz="2595" dirty="0"/>
           </a:p>
           <a:p>
             <a:pPr lvl="1"/>
             <a:r>
               <a:rPr lang="en-ZA" sz="2395" dirty="0"/>
-              <a:t>Install the version corresponding to your operating system.</a:t>
-            </a:r>
+              <a:t>Install the version corresponding to your operating </a:t>
+            </a:r>
+            <a:r>
+              <a:rPr lang="en-ZA" sz="2395" dirty="0" smtClean="0"/>
+              <a:t>system</a:t>
+            </a:r>
+            <a:endParaRPr lang="en-ZA" sz="2395" dirty="0"/>
           </a:p>
           <a:p>
             <a:pPr lvl="1">
@@ -7006,8 +7008,13 @@
           <a:p>
             <a:r>
               <a:rPr lang="en-ZA" sz="2595" dirty="0" smtClean="0"/>
-              <a:t>Introduce yourself to git. </a:t>
-            </a:r>
+              <a:t>Introduce yourself to </a:t>
+            </a:r>
+            <a:r>
+              <a:rPr lang="en-ZA" sz="2595" dirty="0" smtClean="0"/>
+              <a:t>git</a:t>
+            </a:r>
+            <a:endParaRPr lang="en-ZA" sz="2595" dirty="0" smtClean="0"/>
           </a:p>
           <a:p>
             <a:pPr lvl="1">
@@ -7028,7 +7035,7 @@
             </a:r>
             <a:r>
               <a:rPr lang="en-ZA" sz="2395" dirty="0" smtClean="0"/>
-              <a:t>account. </a:t>
+              <a:t>account</a:t>
             </a:r>
             <a:endParaRPr lang="en-US" dirty="0"/>
           </a:p>
@@ -7037,7 +7044,7 @@
     </p:spTree>
     <p:extLst>
       <p:ext uri="{BB962C8B-B14F-4D97-AF65-F5344CB8AC3E}">
-        <p14:creationId xmlns="" xmlns:a="http://schemas.openxmlformats.org/drawingml/2006/main" xmlns:r="http://schemas.openxmlformats.org/officeDocument/2006/relationships" xmlns:p="http://schemas.openxmlformats.org/presentationml/2006/main" xmlns:p14="http://schemas.microsoft.com/office/powerpoint/2010/main" xmlns:mv="urn:schemas-microsoft-com:mac:vml" xmlns:mc="http://schemas.openxmlformats.org/markup-compatibility/2006" val="2617072906"/>
+        <p14:creationId xmlns:p14="http://schemas.microsoft.com/office/powerpoint/2010/main" val="2617072906"/>
       </p:ext>
     </p:extLst>
   </p:cSld>
@@ -7055,7 +7062,7 @@
 </file>
 
 <file path=ppt/slides/slide4.xml><?xml version="1.0" encoding="utf-8"?>
-<p:sld xmlns:a="http://schemas.openxmlformats.org/drawingml/2006/main" xmlns:r="http://schemas.openxmlformats.org/officeDocument/2006/relationships" xmlns:mc="http://schemas.openxmlformats.org/markup-compatibility/2006" xmlns:mv="urn:schemas-microsoft-com:mac:vml" xmlns:p="http://schemas.openxmlformats.org/presentationml/2006/main" mc:Ignorable="mv" mc:PreserveAttributes="mv:*">
+<p:sld xmlns:a="http://schemas.openxmlformats.org/drawingml/2006/main" xmlns:r="http://schemas.openxmlformats.org/officeDocument/2006/relationships" xmlns:p="http://schemas.openxmlformats.org/presentationml/2006/main">
   <p:cSld>
     <p:spTree>
       <p:nvGrpSpPr>
@@ -7150,7 +7157,7 @@
 </file>
 
 <file path=ppt/slides/slide5.xml><?xml version="1.0" encoding="utf-8"?>
-<p:sld xmlns:a="http://schemas.openxmlformats.org/drawingml/2006/main" xmlns:r="http://schemas.openxmlformats.org/officeDocument/2006/relationships" xmlns:mc="http://schemas.openxmlformats.org/markup-compatibility/2006" xmlns:mv="urn:schemas-microsoft-com:mac:vml" xmlns:p="http://schemas.openxmlformats.org/presentationml/2006/main" mc:Ignorable="mv" mc:PreserveAttributes="mv:*">
+<p:sld xmlns:a="http://schemas.openxmlformats.org/drawingml/2006/main" xmlns:r="http://schemas.openxmlformats.org/officeDocument/2006/relationships" xmlns:p="http://schemas.openxmlformats.org/presentationml/2006/main">
   <p:cSld>
     <p:spTree>
       <p:nvGrpSpPr>
@@ -7515,7 +7522,7 @@
     </p:spTree>
     <p:extLst>
       <p:ext uri="{BB962C8B-B14F-4D97-AF65-F5344CB8AC3E}">
-        <p14:creationId xmlns="" xmlns:a="http://schemas.openxmlformats.org/drawingml/2006/main" xmlns:r="http://schemas.openxmlformats.org/officeDocument/2006/relationships" xmlns:p="http://schemas.openxmlformats.org/presentationml/2006/main" xmlns:p14="http://schemas.microsoft.com/office/powerpoint/2010/main" xmlns:mv="urn:schemas-microsoft-com:mac:vml" xmlns:mc="http://schemas.openxmlformats.org/markup-compatibility/2006" val="3276086069"/>
+        <p14:creationId xmlns:p14="http://schemas.microsoft.com/office/powerpoint/2010/main" val="3276086069"/>
       </p:ext>
     </p:extLst>
   </p:cSld>
@@ -7533,7 +7540,7 @@
 </file>
 
 <file path=ppt/slides/slide6.xml><?xml version="1.0" encoding="utf-8"?>
-<p:sld xmlns:a="http://schemas.openxmlformats.org/drawingml/2006/main" xmlns:r="http://schemas.openxmlformats.org/officeDocument/2006/relationships" xmlns:mc="http://schemas.openxmlformats.org/markup-compatibility/2006" xmlns:mv="urn:schemas-microsoft-com:mac:vml" xmlns:p="http://schemas.openxmlformats.org/presentationml/2006/main" mc:Ignorable="mv" mc:PreserveAttributes="mv:*">
+<p:sld xmlns:a="http://schemas.openxmlformats.org/drawingml/2006/main" xmlns:r="http://schemas.openxmlformats.org/officeDocument/2006/relationships" xmlns:p="http://schemas.openxmlformats.org/presentationml/2006/main">
   <p:cSld>
     <p:spTree>
       <p:nvGrpSpPr>
@@ -7876,7 +7883,7 @@
     </p:spTree>
     <p:extLst>
       <p:ext uri="{BB962C8B-B14F-4D97-AF65-F5344CB8AC3E}">
-        <p14:creationId xmlns="" xmlns:a="http://schemas.openxmlformats.org/drawingml/2006/main" xmlns:r="http://schemas.openxmlformats.org/officeDocument/2006/relationships" xmlns:p="http://schemas.openxmlformats.org/presentationml/2006/main" xmlns:p14="http://schemas.microsoft.com/office/powerpoint/2010/main" xmlns:mv="urn:schemas-microsoft-com:mac:vml" xmlns:mc="http://schemas.openxmlformats.org/markup-compatibility/2006" val="520927691"/>
+        <p14:creationId xmlns:p14="http://schemas.microsoft.com/office/powerpoint/2010/main" val="520927691"/>
       </p:ext>
     </p:extLst>
   </p:cSld>
@@ -7894,7 +7901,7 @@
 </file>
 
 <file path=ppt/slides/slide7.xml><?xml version="1.0" encoding="utf-8"?>
-<p:sld xmlns:a="http://schemas.openxmlformats.org/drawingml/2006/main" xmlns:r="http://schemas.openxmlformats.org/officeDocument/2006/relationships" xmlns:mc="http://schemas.openxmlformats.org/markup-compatibility/2006" xmlns:mv="urn:schemas-microsoft-com:mac:vml" xmlns:p="http://schemas.openxmlformats.org/presentationml/2006/main" mc:Ignorable="mv" mc:PreserveAttributes="mv:*">
+<p:sld xmlns:a="http://schemas.openxmlformats.org/drawingml/2006/main" xmlns:r="http://schemas.openxmlformats.org/officeDocument/2006/relationships" xmlns:p="http://schemas.openxmlformats.org/presentationml/2006/main">
   <p:cSld>
     <p:spTree>
       <p:nvGrpSpPr>
@@ -7951,7 +7958,7 @@
         </p:spPr>
         <p:txBody>
           <a:bodyPr>
-            <a:normAutofit fontScale="85000" lnSpcReduction="20000"/>
+            <a:normAutofit fontScale="92500" lnSpcReduction="20000"/>
           </a:bodyPr>
           <a:lstStyle/>
           <a:p>
@@ -8122,7 +8129,7 @@
                 </a:solidFill>
                 <a:hlinkClick r:id="rId8"/>
               </a:rPr>
-              <a:t>http://</a:t>
+              <a:t>http://nyuccl.org/pages/gittutorial</a:t>
             </a:r>
             <a:r>
               <a:rPr lang="en-ZA" dirty="0" smtClean="0">
@@ -8131,26 +8138,18 @@
                 </a:solidFill>
                 <a:hlinkClick r:id="rId8"/>
               </a:rPr>
-              <a:t>developers.useflashpunk.net/t/how-to-use-</a:t>
-            </a:r>
-            <a:r>
-              <a:rPr lang="en-US" dirty="0" smtClean="0">
+              <a:t>/</a:t>
+            </a:r>
+            <a:r>
+              <a:rPr lang="en-ZA" dirty="0" smtClean="0">
                 <a:solidFill>
                   <a:srgbClr val="00B050"/>
                 </a:solidFill>
-                <a:hlinkClick r:id="rId8"/>
               </a:rPr>
-              <a:t>SmartGit</a:t>
-            </a:r>
-            <a:r>
-              <a:rPr lang="en-ZA" dirty="0" smtClean="0">
-                <a:solidFill>
-                  <a:srgbClr val="00B050"/>
-                </a:solidFill>
-                <a:hlinkClick r:id="rId8"/>
-              </a:rPr>
-              <a:t>-and-github-to-send-your-fp-modifications-pull-requests/1586</a:t>
-            </a:r>
+              <a:t> </a:t>
+            </a:r>
+          </a:p>
+          <a:p>
             <a:endParaRPr lang="en-ZA" dirty="0" smtClean="0">
               <a:solidFill>
                 <a:srgbClr val="00B050"/>
@@ -8158,6 +8157,24 @@
             </a:endParaRPr>
           </a:p>
           <a:p>
+            <a:pPr marL="0" indent="0">
+              <a:buNone/>
+            </a:pPr>
+            <a:r>
+              <a:rPr lang="en-ZA" dirty="0" smtClean="0">
+                <a:solidFill>
+                  <a:schemeClr val="tx2"/>
+                </a:solidFill>
+              </a:rPr>
+              <a:t>Cheat Sheets</a:t>
+            </a:r>
+            <a:endParaRPr lang="en-US" dirty="0">
+              <a:solidFill>
+                <a:schemeClr val="tx2"/>
+              </a:solidFill>
+            </a:endParaRPr>
+          </a:p>
+          <a:p>
             <a:r>
               <a:rPr lang="en-ZA" dirty="0">
                 <a:solidFill>
@@ -8165,25 +8182,16 @@
                 </a:solidFill>
                 <a:hlinkClick r:id="rId9"/>
               </a:rPr>
-              <a:t>http://dexterlin.com/programming/creating-local-git-repositories-with-</a:t>
-            </a:r>
-            <a:r>
-              <a:rPr lang="en-US" dirty="0">
+              <a:t>http://</a:t>
+            </a:r>
+            <a:r>
+              <a:rPr lang="en-ZA" dirty="0" smtClean="0">
                 <a:solidFill>
                   <a:srgbClr val="00B050"/>
                 </a:solidFill>
                 <a:hlinkClick r:id="rId9"/>
               </a:rPr>
-              <a:t>SmartGit</a:t>
-            </a:r>
-            <a:r>
-              <a:rPr lang="en-ZA" dirty="0" smtClean="0">
-                <a:solidFill>
-                  <a:srgbClr val="00B050"/>
-                </a:solidFill>
-                <a:hlinkClick r:id="rId9"/>
-              </a:rPr>
-              <a:t>/</a:t>
+              <a:t>rogerdudler.github.io/git-guide/files/git_cheat_sheet.pdf</a:t>
             </a:r>
             <a:endParaRPr lang="en-ZA" dirty="0" smtClean="0">
               <a:solidFill>
@@ -8192,62 +8200,12 @@
             </a:endParaRPr>
           </a:p>
           <a:p>
-            <a:endParaRPr lang="en-ZA" dirty="0" smtClean="0">
-              <a:solidFill>
-                <a:srgbClr val="00B050"/>
-              </a:solidFill>
-            </a:endParaRPr>
-          </a:p>
-          <a:p>
-            <a:pPr marL="0" indent="0">
-              <a:buNone/>
-            </a:pPr>
-            <a:r>
-              <a:rPr lang="en-ZA" dirty="0" smtClean="0">
-                <a:solidFill>
-                  <a:schemeClr val="tx2"/>
-                </a:solidFill>
-              </a:rPr>
-              <a:t>Cheat Sheets</a:t>
-            </a:r>
-            <a:endParaRPr lang="en-US" dirty="0">
-              <a:solidFill>
-                <a:schemeClr val="tx2"/>
-              </a:solidFill>
-            </a:endParaRPr>
-          </a:p>
-          <a:p>
             <a:r>
               <a:rPr lang="en-ZA" dirty="0">
                 <a:solidFill>
                   <a:srgbClr val="00B050"/>
                 </a:solidFill>
                 <a:hlinkClick r:id="rId10"/>
-              </a:rPr>
-              <a:t>http://</a:t>
-            </a:r>
-            <a:r>
-              <a:rPr lang="en-ZA" dirty="0" smtClean="0">
-                <a:solidFill>
-                  <a:srgbClr val="00B050"/>
-                </a:solidFill>
-                <a:hlinkClick r:id="rId10"/>
-              </a:rPr>
-              <a:t>rogerdudler.github.io/git-guide/files/git_cheat_sheet.pdf</a:t>
-            </a:r>
-            <a:endParaRPr lang="en-ZA" dirty="0" smtClean="0">
-              <a:solidFill>
-                <a:srgbClr val="00B050"/>
-              </a:solidFill>
-            </a:endParaRPr>
-          </a:p>
-          <a:p>
-            <a:r>
-              <a:rPr lang="en-ZA" dirty="0">
-                <a:solidFill>
-                  <a:srgbClr val="00B050"/>
-                </a:solidFill>
-                <a:hlinkClick r:id="rId11"/>
               </a:rPr>
               <a:t>https://training.github.com/kit/downloads/github-git-cheat-sheet.pdf</a:t>
             </a:r>
@@ -8271,7 +8229,7 @@
     </p:spTree>
     <p:extLst>
       <p:ext uri="{BB962C8B-B14F-4D97-AF65-F5344CB8AC3E}">
-        <p14:creationId xmlns="" xmlns:a="http://schemas.openxmlformats.org/drawingml/2006/main" xmlns:r="http://schemas.openxmlformats.org/officeDocument/2006/relationships" xmlns:p="http://schemas.openxmlformats.org/presentationml/2006/main" xmlns:p14="http://schemas.microsoft.com/office/powerpoint/2010/main" xmlns:mv="urn:schemas-microsoft-com:mac:vml" xmlns:mc="http://schemas.openxmlformats.org/markup-compatibility/2006" val="2955015948"/>
+        <p14:creationId xmlns:p14="http://schemas.microsoft.com/office/powerpoint/2010/main" val="2955015948"/>
       </p:ext>
     </p:extLst>
   </p:cSld>
@@ -8539,7 +8497,7 @@
   <a:extraClrSchemeLst/>
   <a:extLst>
     <a:ext uri="{05A4C25C-085E-4340-85A3-A5531E510DB2}">
-      <thm15:themeFamily xmlns="" xmlns:a="http://schemas.openxmlformats.org/drawingml/2006/main" xmlns:thm15="http://schemas.microsoft.com/office/thememl/2012/main" name="Facet" id="{C0C680CD-088A-49FC-A102-D699147F32B2}" vid="{CFBC31BA-B70F-4F30-BCAA-4F3011E16C4D}"/>
+      <thm15:themeFamily xmlns:thm15="http://schemas.microsoft.com/office/thememl/2012/main" name="Facet" id="{C0C680CD-088A-49FC-A102-D699147F32B2}" vid="{CFBC31BA-B70F-4F30-BCAA-4F3011E16C4D}"/>
     </a:ext>
   </a:extLst>
 </a:theme>
@@ -8800,7 +8758,7 @@
   <a:extraClrSchemeLst/>
   <a:extLst>
     <a:ext uri="{05A4C25C-085E-4340-85A3-A5531E510DB2}">
-      <thm15:themeFamily xmlns="" xmlns:a="http://schemas.openxmlformats.org/drawingml/2006/main" xmlns:thm15="http://schemas.microsoft.com/office/thememl/2012/main" name="Office Theme" id="{62F939B6-93AF-4DB8-9C6B-D6C7DFDC589F}" vid="{4A3C46E8-61CC-4603-A589-7422A47A8E4A}"/>
+      <thm15:themeFamily xmlns:thm15="http://schemas.microsoft.com/office/thememl/2012/main" name="Office Theme" id="{62F939B6-93AF-4DB8-9C6B-D6C7DFDC589F}" vid="{4A3C46E8-61CC-4603-A589-7422A47A8E4A}"/>
     </a:ext>
   </a:extLst>
 </a:theme>

</xml_diff>